<commit_message>
one player done mostly
</commit_message>
<xml_diff>
--- a/SwingAlong/pictures!.pptx
+++ b/SwingAlong/pictures!.pptx
@@ -243,7 +243,7 @@
           <a:p>
             <a:fld id="{5388B340-692C-4345-A1B1-ED450578B1EE}" type="datetimeFigureOut">
               <a:rPr lang="en-CA" smtClean="0"/>
-              <a:t>2019-05-07</a:t>
+              <a:t>2019-05-09</a:t>
             </a:fld>
             <a:endParaRPr lang="en-CA"/>
           </a:p>
@@ -413,7 +413,7 @@
           <a:p>
             <a:fld id="{5388B340-692C-4345-A1B1-ED450578B1EE}" type="datetimeFigureOut">
               <a:rPr lang="en-CA" smtClean="0"/>
-              <a:t>2019-05-07</a:t>
+              <a:t>2019-05-09</a:t>
             </a:fld>
             <a:endParaRPr lang="en-CA"/>
           </a:p>
@@ -593,7 +593,7 @@
           <a:p>
             <a:fld id="{5388B340-692C-4345-A1B1-ED450578B1EE}" type="datetimeFigureOut">
               <a:rPr lang="en-CA" smtClean="0"/>
-              <a:t>2019-05-07</a:t>
+              <a:t>2019-05-09</a:t>
             </a:fld>
             <a:endParaRPr lang="en-CA"/>
           </a:p>
@@ -763,7 +763,7 @@
           <a:p>
             <a:fld id="{5388B340-692C-4345-A1B1-ED450578B1EE}" type="datetimeFigureOut">
               <a:rPr lang="en-CA" smtClean="0"/>
-              <a:t>2019-05-07</a:t>
+              <a:t>2019-05-09</a:t>
             </a:fld>
             <a:endParaRPr lang="en-CA"/>
           </a:p>
@@ -1009,7 +1009,7 @@
           <a:p>
             <a:fld id="{5388B340-692C-4345-A1B1-ED450578B1EE}" type="datetimeFigureOut">
               <a:rPr lang="en-CA" smtClean="0"/>
-              <a:t>2019-05-07</a:t>
+              <a:t>2019-05-09</a:t>
             </a:fld>
             <a:endParaRPr lang="en-CA"/>
           </a:p>
@@ -1241,7 +1241,7 @@
           <a:p>
             <a:fld id="{5388B340-692C-4345-A1B1-ED450578B1EE}" type="datetimeFigureOut">
               <a:rPr lang="en-CA" smtClean="0"/>
-              <a:t>2019-05-07</a:t>
+              <a:t>2019-05-09</a:t>
             </a:fld>
             <a:endParaRPr lang="en-CA"/>
           </a:p>
@@ -1608,7 +1608,7 @@
           <a:p>
             <a:fld id="{5388B340-692C-4345-A1B1-ED450578B1EE}" type="datetimeFigureOut">
               <a:rPr lang="en-CA" smtClean="0"/>
-              <a:t>2019-05-07</a:t>
+              <a:t>2019-05-09</a:t>
             </a:fld>
             <a:endParaRPr lang="en-CA"/>
           </a:p>
@@ -1726,7 +1726,7 @@
           <a:p>
             <a:fld id="{5388B340-692C-4345-A1B1-ED450578B1EE}" type="datetimeFigureOut">
               <a:rPr lang="en-CA" smtClean="0"/>
-              <a:t>2019-05-07</a:t>
+              <a:t>2019-05-09</a:t>
             </a:fld>
             <a:endParaRPr lang="en-CA"/>
           </a:p>
@@ -1821,7 +1821,7 @@
           <a:p>
             <a:fld id="{5388B340-692C-4345-A1B1-ED450578B1EE}" type="datetimeFigureOut">
               <a:rPr lang="en-CA" smtClean="0"/>
-              <a:t>2019-05-07</a:t>
+              <a:t>2019-05-09</a:t>
             </a:fld>
             <a:endParaRPr lang="en-CA"/>
           </a:p>
@@ -2098,7 +2098,7 @@
           <a:p>
             <a:fld id="{5388B340-692C-4345-A1B1-ED450578B1EE}" type="datetimeFigureOut">
               <a:rPr lang="en-CA" smtClean="0"/>
-              <a:t>2019-05-07</a:t>
+              <a:t>2019-05-09</a:t>
             </a:fld>
             <a:endParaRPr lang="en-CA"/>
           </a:p>
@@ -2351,7 +2351,7 @@
           <a:p>
             <a:fld id="{5388B340-692C-4345-A1B1-ED450578B1EE}" type="datetimeFigureOut">
               <a:rPr lang="en-CA" smtClean="0"/>
-              <a:t>2019-05-07</a:t>
+              <a:t>2019-05-09</a:t>
             </a:fld>
             <a:endParaRPr lang="en-CA"/>
           </a:p>
@@ -2564,7 +2564,7 @@
           <a:p>
             <a:fld id="{5388B340-692C-4345-A1B1-ED450578B1EE}" type="datetimeFigureOut">
               <a:rPr lang="en-CA" smtClean="0"/>
-              <a:t>2019-05-07</a:t>
+              <a:t>2019-05-09</a:t>
             </a:fld>
             <a:endParaRPr lang="en-CA"/>
           </a:p>
@@ -3290,6 +3290,35 @@
           </a:prstGeom>
         </p:spPr>
       </p:pic>
+      <p:pic>
+        <p:nvPicPr>
+          <p:cNvPr id="12" name="Picture 11"/>
+          <p:cNvPicPr>
+            <a:picLocks noChangeAspect="1"/>
+          </p:cNvPicPr>
+          <p:nvPr/>
+        </p:nvPicPr>
+        <p:blipFill rotWithShape="1">
+          <a:blip r:embed="rId2">
+            <a:extLst>
+              <a:ext uri="{28A0092B-C50C-407E-A947-70E740481C1C}">
+                <a14:useLocalDpi xmlns:a14="http://schemas.microsoft.com/office/drawing/2010/main" val="0"/>
+              </a:ext>
+            </a:extLst>
+          </a:blip>
+          <a:srcRect l="83380" t="30826" r="460" b="1437"/>
+          <a:stretch/>
+        </p:blipFill>
+        <p:spPr>
+          <a:xfrm>
+            <a:off x="9199034" y="3509433"/>
+            <a:ext cx="863600" cy="929218"/>
+          </a:xfrm>
+          <a:prstGeom prst="rect">
+            <a:avLst/>
+          </a:prstGeom>
+        </p:spPr>
+      </p:pic>
     </p:spTree>
     <p:extLst>
       <p:ext uri="{BB962C8B-B14F-4D97-AF65-F5344CB8AC3E}">

</xml_diff>

<commit_message>
Finished i think - i hope
</commit_message>
<xml_diff>
--- a/SwingAlong/pictures!.pptx
+++ b/SwingAlong/pictures!.pptx
@@ -6,6 +6,7 @@
   </p:sldMasterIdLst>
   <p:sldIdLst>
     <p:sldId id="256" r:id="rId2"/>
+    <p:sldId id="257" r:id="rId3"/>
   </p:sldIdLst>
   <p:sldSz cx="12192000" cy="6858000"/>
   <p:notesSz cx="6858000" cy="9144000"/>
@@ -243,7 +244,7 @@
           <a:p>
             <a:fld id="{5388B340-692C-4345-A1B1-ED450578B1EE}" type="datetimeFigureOut">
               <a:rPr lang="en-CA" smtClean="0"/>
-              <a:t>2019-05-09</a:t>
+              <a:t>2019-05-12</a:t>
             </a:fld>
             <a:endParaRPr lang="en-CA"/>
           </a:p>
@@ -413,7 +414,7 @@
           <a:p>
             <a:fld id="{5388B340-692C-4345-A1B1-ED450578B1EE}" type="datetimeFigureOut">
               <a:rPr lang="en-CA" smtClean="0"/>
-              <a:t>2019-05-09</a:t>
+              <a:t>2019-05-12</a:t>
             </a:fld>
             <a:endParaRPr lang="en-CA"/>
           </a:p>
@@ -593,7 +594,7 @@
           <a:p>
             <a:fld id="{5388B340-692C-4345-A1B1-ED450578B1EE}" type="datetimeFigureOut">
               <a:rPr lang="en-CA" smtClean="0"/>
-              <a:t>2019-05-09</a:t>
+              <a:t>2019-05-12</a:t>
             </a:fld>
             <a:endParaRPr lang="en-CA"/>
           </a:p>
@@ -763,7 +764,7 @@
           <a:p>
             <a:fld id="{5388B340-692C-4345-A1B1-ED450578B1EE}" type="datetimeFigureOut">
               <a:rPr lang="en-CA" smtClean="0"/>
-              <a:t>2019-05-09</a:t>
+              <a:t>2019-05-12</a:t>
             </a:fld>
             <a:endParaRPr lang="en-CA"/>
           </a:p>
@@ -1009,7 +1010,7 @@
           <a:p>
             <a:fld id="{5388B340-692C-4345-A1B1-ED450578B1EE}" type="datetimeFigureOut">
               <a:rPr lang="en-CA" smtClean="0"/>
-              <a:t>2019-05-09</a:t>
+              <a:t>2019-05-12</a:t>
             </a:fld>
             <a:endParaRPr lang="en-CA"/>
           </a:p>
@@ -1241,7 +1242,7 @@
           <a:p>
             <a:fld id="{5388B340-692C-4345-A1B1-ED450578B1EE}" type="datetimeFigureOut">
               <a:rPr lang="en-CA" smtClean="0"/>
-              <a:t>2019-05-09</a:t>
+              <a:t>2019-05-12</a:t>
             </a:fld>
             <a:endParaRPr lang="en-CA"/>
           </a:p>
@@ -1608,7 +1609,7 @@
           <a:p>
             <a:fld id="{5388B340-692C-4345-A1B1-ED450578B1EE}" type="datetimeFigureOut">
               <a:rPr lang="en-CA" smtClean="0"/>
-              <a:t>2019-05-09</a:t>
+              <a:t>2019-05-12</a:t>
             </a:fld>
             <a:endParaRPr lang="en-CA"/>
           </a:p>
@@ -1726,7 +1727,7 @@
           <a:p>
             <a:fld id="{5388B340-692C-4345-A1B1-ED450578B1EE}" type="datetimeFigureOut">
               <a:rPr lang="en-CA" smtClean="0"/>
-              <a:t>2019-05-09</a:t>
+              <a:t>2019-05-12</a:t>
             </a:fld>
             <a:endParaRPr lang="en-CA"/>
           </a:p>
@@ -1821,7 +1822,7 @@
           <a:p>
             <a:fld id="{5388B340-692C-4345-A1B1-ED450578B1EE}" type="datetimeFigureOut">
               <a:rPr lang="en-CA" smtClean="0"/>
-              <a:t>2019-05-09</a:t>
+              <a:t>2019-05-12</a:t>
             </a:fld>
             <a:endParaRPr lang="en-CA"/>
           </a:p>
@@ -2098,7 +2099,7 @@
           <a:p>
             <a:fld id="{5388B340-692C-4345-A1B1-ED450578B1EE}" type="datetimeFigureOut">
               <a:rPr lang="en-CA" smtClean="0"/>
-              <a:t>2019-05-09</a:t>
+              <a:t>2019-05-12</a:t>
             </a:fld>
             <a:endParaRPr lang="en-CA"/>
           </a:p>
@@ -2351,7 +2352,7 @@
           <a:p>
             <a:fld id="{5388B340-692C-4345-A1B1-ED450578B1EE}" type="datetimeFigureOut">
               <a:rPr lang="en-CA" smtClean="0"/>
-              <a:t>2019-05-09</a:t>
+              <a:t>2019-05-12</a:t>
             </a:fld>
             <a:endParaRPr lang="en-CA"/>
           </a:p>
@@ -2564,7 +2565,7 @@
           <a:p>
             <a:fld id="{5388B340-692C-4345-A1B1-ED450578B1EE}" type="datetimeFigureOut">
               <a:rPr lang="en-CA" smtClean="0"/>
-              <a:t>2019-05-09</a:t>
+              <a:t>2019-05-12</a:t>
             </a:fld>
             <a:endParaRPr lang="en-CA"/>
           </a:p>
@@ -3001,38 +3002,6 @@
       </p:pic>
       <p:pic>
         <p:nvPicPr>
-          <p:cNvPr id="15" name="Picture 14"/>
-          <p:cNvPicPr>
-            <a:picLocks noChangeAspect="1"/>
-          </p:cNvPicPr>
-          <p:nvPr/>
-        </p:nvPicPr>
-        <p:blipFill rotWithShape="1">
-          <a:blip r:embed="rId2">
-            <a:extLst>
-              <a:ext uri="{28A0092B-C50C-407E-A947-70E740481C1C}">
-                <a14:useLocalDpi xmlns:a14="http://schemas.microsoft.com/office/drawing/2010/main" val="0"/>
-              </a:ext>
-            </a:extLst>
-          </a:blip>
-          <a:srcRect l="990" t="20863" r="85937"/>
-          <a:stretch/>
-        </p:blipFill>
-        <p:spPr>
-          <a:xfrm>
-            <a:off x="2818405" y="398933"/>
-            <a:ext cx="698667" cy="1085597"/>
-          </a:xfrm>
-          <a:prstGeom prst="rect">
-            <a:avLst/>
-          </a:prstGeom>
-          <a:ln>
-            <a:noFill/>
-          </a:ln>
-        </p:spPr>
-      </p:pic>
-      <p:pic>
-        <p:nvPicPr>
           <p:cNvPr id="16" name="Picture 15"/>
           <p:cNvPicPr>
             <a:picLocks noChangeAspect="1"/>
@@ -3199,38 +3168,6 @@
       </p:pic>
       <p:pic>
         <p:nvPicPr>
-          <p:cNvPr id="9" name="Picture 8"/>
-          <p:cNvPicPr>
-            <a:picLocks noChangeAspect="1"/>
-          </p:cNvPicPr>
-          <p:nvPr/>
-        </p:nvPicPr>
-        <p:blipFill rotWithShape="1">
-          <a:blip r:embed="rId2">
-            <a:extLst>
-              <a:ext uri="{28A0092B-C50C-407E-A947-70E740481C1C}">
-                <a14:useLocalDpi xmlns:a14="http://schemas.microsoft.com/office/drawing/2010/main" val="0"/>
-              </a:ext>
-            </a:extLst>
-          </a:blip>
-          <a:srcRect l="26018" r="60819"/>
-          <a:stretch/>
-        </p:blipFill>
-        <p:spPr>
-          <a:xfrm>
-            <a:off x="184328" y="2563012"/>
-            <a:ext cx="703478" cy="1371791"/>
-          </a:xfrm>
-          <a:prstGeom prst="rect">
-            <a:avLst/>
-          </a:prstGeom>
-          <a:ln>
-            <a:noFill/>
-          </a:ln>
-        </p:spPr>
-      </p:pic>
-      <p:pic>
-        <p:nvPicPr>
           <p:cNvPr id="10" name="Picture 9"/>
           <p:cNvPicPr>
             <a:picLocks noChangeAspect="1"/>
@@ -3250,7 +3187,7 @@
         </p:blipFill>
         <p:spPr>
           <a:xfrm>
-            <a:off x="887806" y="2563011"/>
+            <a:off x="1676033" y="2381153"/>
             <a:ext cx="703478" cy="1371791"/>
           </a:xfrm>
           <a:prstGeom prst="rect">
@@ -3263,14 +3200,51 @@
       </p:pic>
       <p:pic>
         <p:nvPicPr>
-          <p:cNvPr id="2" name="Picture 1"/>
+          <p:cNvPr id="3" name="Picture 2"/>
+          <p:cNvPicPr>
+            <a:picLocks noChangeAspect="1"/>
+          </p:cNvPicPr>
+          <p:nvPr/>
+        </p:nvPicPr>
+        <p:blipFill>
+          <a:blip r:embed="rId3">
+            <a:extLst>
+              <a:ext uri="{28A0092B-C50C-407E-A947-70E740481C1C}">
+                <a14:useLocalDpi xmlns:a14="http://schemas.microsoft.com/office/drawing/2010/main" val="0"/>
+              </a:ext>
+            </a:extLst>
+          </a:blip>
+          <a:stretch>
+            <a:fillRect/>
+          </a:stretch>
+        </p:blipFill>
+        <p:spPr>
+          <a:xfrm>
+            <a:off x="7182291" y="-1524087"/>
+            <a:ext cx="6840305" cy="3883489"/>
+          </a:xfrm>
+          <a:prstGeom prst="rect">
+            <a:avLst/>
+          </a:prstGeom>
+        </p:spPr>
+      </p:pic>
+      <p:pic>
+        <p:nvPicPr>
+          <p:cNvPr id="13" name="Picture 12"/>
           <p:cNvPicPr>
             <a:picLocks noChangeAspect="1"/>
           </p:cNvPicPr>
           <p:nvPr/>
         </p:nvPicPr>
         <p:blipFill rotWithShape="1">
-          <a:blip r:embed="rId3">
+          <a:blip r:embed="rId4">
+            <a:duotone>
+              <a:prstClr val="black"/>
+              <a:schemeClr val="accent2">
+                <a:tint val="45000"/>
+                <a:satMod val="400000"/>
+              </a:schemeClr>
+            </a:duotone>
             <a:extLst>
               <a:ext uri="{28A0092B-C50C-407E-A947-70E740481C1C}">
                 <a14:useLocalDpi xmlns:a14="http://schemas.microsoft.com/office/drawing/2010/main" val="0"/>
@@ -3281,9 +3255,9 @@
           <a:stretch/>
         </p:blipFill>
         <p:spPr>
-          <a:xfrm>
-            <a:off x="6075680" y="2979738"/>
-            <a:ext cx="45719" cy="884237"/>
+          <a:xfrm rot="5400000">
+            <a:off x="2927214" y="3786666"/>
+            <a:ext cx="113557" cy="1303969"/>
           </a:xfrm>
           <a:prstGeom prst="rect">
             <a:avLst/>
@@ -3311,8 +3285,70 @@
         </p:blipFill>
         <p:spPr>
           <a:xfrm>
-            <a:off x="9199034" y="3509433"/>
-            <a:ext cx="863600" cy="929218"/>
+            <a:off x="3139385" y="1205454"/>
+            <a:ext cx="809127" cy="870606"/>
+          </a:xfrm>
+          <a:prstGeom prst="rect">
+            <a:avLst/>
+          </a:prstGeom>
+        </p:spPr>
+      </p:pic>
+      <p:pic>
+        <p:nvPicPr>
+          <p:cNvPr id="9" name="Picture 8"/>
+          <p:cNvPicPr>
+            <a:picLocks noChangeAspect="1"/>
+          </p:cNvPicPr>
+          <p:nvPr/>
+        </p:nvPicPr>
+        <p:blipFill rotWithShape="1">
+          <a:blip r:embed="rId2">
+            <a:extLst>
+              <a:ext uri="{28A0092B-C50C-407E-A947-70E740481C1C}">
+                <a14:useLocalDpi xmlns:a14="http://schemas.microsoft.com/office/drawing/2010/main" val="0"/>
+              </a:ext>
+            </a:extLst>
+          </a:blip>
+          <a:srcRect l="26018" r="60819"/>
+          <a:stretch/>
+        </p:blipFill>
+        <p:spPr>
+          <a:xfrm>
+            <a:off x="4742687" y="549263"/>
+            <a:ext cx="856617" cy="1559835"/>
+          </a:xfrm>
+          <a:prstGeom prst="rect">
+            <a:avLst/>
+          </a:prstGeom>
+          <a:ln>
+            <a:noFill/>
+          </a:ln>
+        </p:spPr>
+      </p:pic>
+      <p:pic>
+        <p:nvPicPr>
+          <p:cNvPr id="5" name="Picture 4"/>
+          <p:cNvPicPr>
+            <a:picLocks noChangeAspect="1"/>
+          </p:cNvPicPr>
+          <p:nvPr/>
+        </p:nvPicPr>
+        <p:blipFill>
+          <a:blip r:embed="rId5">
+            <a:extLst>
+              <a:ext uri="{28A0092B-C50C-407E-A947-70E740481C1C}">
+                <a14:useLocalDpi xmlns:a14="http://schemas.microsoft.com/office/drawing/2010/main" val="0"/>
+              </a:ext>
+            </a:extLst>
+          </a:blip>
+          <a:stretch>
+            <a:fillRect/>
+          </a:stretch>
+        </p:blipFill>
+        <p:spPr>
+          <a:xfrm>
+            <a:off x="1816429" y="340727"/>
+            <a:ext cx="816192" cy="870606"/>
           </a:xfrm>
           <a:prstGeom prst="rect">
             <a:avLst/>
@@ -3323,6 +3359,750 @@
     <p:extLst>
       <p:ext uri="{BB962C8B-B14F-4D97-AF65-F5344CB8AC3E}">
         <p14:creationId xmlns:p14="http://schemas.microsoft.com/office/powerpoint/2010/main" val="2948657910"/>
+      </p:ext>
+    </p:extLst>
+  </p:cSld>
+  <p:clrMapOvr>
+    <a:masterClrMapping/>
+  </p:clrMapOvr>
+</p:sld>
+</file>
+
+<file path=ppt/slides/slide2.xml><?xml version="1.0" encoding="utf-8"?>
+<p:sld xmlns:a="http://schemas.openxmlformats.org/drawingml/2006/main" xmlns:r="http://schemas.openxmlformats.org/officeDocument/2006/relationships" xmlns:p="http://schemas.openxmlformats.org/presentationml/2006/main">
+  <p:cSld>
+    <p:spTree>
+      <p:nvGrpSpPr>
+        <p:cNvPr id="1" name=""/>
+        <p:cNvGrpSpPr/>
+        <p:nvPr/>
+      </p:nvGrpSpPr>
+      <p:grpSpPr>
+        <a:xfrm>
+          <a:off x="0" y="0"/>
+          <a:ext cx="0" cy="0"/>
+          <a:chOff x="0" y="0"/>
+          <a:chExt cx="0" cy="0"/>
+        </a:xfrm>
+      </p:grpSpPr>
+      <p:pic>
+        <p:nvPicPr>
+          <p:cNvPr id="4" name="Picture 3"/>
+          <p:cNvPicPr>
+            <a:picLocks noChangeAspect="1"/>
+          </p:cNvPicPr>
+          <p:nvPr/>
+        </p:nvPicPr>
+        <p:blipFill>
+          <a:blip r:embed="rId2">
+            <a:extLst>
+              <a:ext uri="{28A0092B-C50C-407E-A947-70E740481C1C}">
+                <a14:useLocalDpi xmlns:a14="http://schemas.microsoft.com/office/drawing/2010/main" val="0"/>
+              </a:ext>
+            </a:extLst>
+          </a:blip>
+          <a:stretch>
+            <a:fillRect/>
+          </a:stretch>
+        </p:blipFill>
+        <p:spPr>
+          <a:xfrm>
+            <a:off x="2099450" y="4293922"/>
+            <a:ext cx="810838" cy="871804"/>
+          </a:xfrm>
+          <a:prstGeom prst="rect">
+            <a:avLst/>
+          </a:prstGeom>
+        </p:spPr>
+      </p:pic>
+      <p:pic>
+        <p:nvPicPr>
+          <p:cNvPr id="5" name="Picture 4"/>
+          <p:cNvPicPr>
+            <a:picLocks noChangeAspect="1"/>
+          </p:cNvPicPr>
+          <p:nvPr/>
+        </p:nvPicPr>
+        <p:blipFill>
+          <a:blip r:embed="rId3">
+            <a:extLst>
+              <a:ext uri="{28A0092B-C50C-407E-A947-70E740481C1C}">
+                <a14:useLocalDpi xmlns:a14="http://schemas.microsoft.com/office/drawing/2010/main" val="0"/>
+              </a:ext>
+            </a:extLst>
+          </a:blip>
+          <a:stretch>
+            <a:fillRect/>
+          </a:stretch>
+        </p:blipFill>
+        <p:spPr>
+          <a:xfrm>
+            <a:off x="3747164" y="3850448"/>
+            <a:ext cx="701101" cy="1371791"/>
+          </a:xfrm>
+          <a:prstGeom prst="rect">
+            <a:avLst/>
+          </a:prstGeom>
+        </p:spPr>
+      </p:pic>
+      <p:pic>
+        <p:nvPicPr>
+          <p:cNvPr id="6" name="Picture 5"/>
+          <p:cNvPicPr>
+            <a:picLocks noChangeAspect="1"/>
+          </p:cNvPicPr>
+          <p:nvPr/>
+        </p:nvPicPr>
+        <p:blipFill>
+          <a:blip r:embed="rId4">
+            <a:extLst>
+              <a:ext uri="{28A0092B-C50C-407E-A947-70E740481C1C}">
+                <a14:useLocalDpi xmlns:a14="http://schemas.microsoft.com/office/drawing/2010/main" val="0"/>
+              </a:ext>
+            </a:extLst>
+          </a:blip>
+          <a:stretch>
+            <a:fillRect/>
+          </a:stretch>
+        </p:blipFill>
+        <p:spPr>
+          <a:xfrm>
+            <a:off x="4798815" y="3862546"/>
+            <a:ext cx="701101" cy="1371791"/>
+          </a:xfrm>
+          <a:prstGeom prst="rect">
+            <a:avLst/>
+          </a:prstGeom>
+        </p:spPr>
+      </p:pic>
+      <p:pic>
+        <p:nvPicPr>
+          <p:cNvPr id="7" name="Picture 6"/>
+          <p:cNvPicPr>
+            <a:picLocks noChangeAspect="1"/>
+          </p:cNvPicPr>
+          <p:nvPr/>
+        </p:nvPicPr>
+        <p:blipFill>
+          <a:blip r:embed="rId5">
+            <a:extLst>
+              <a:ext uri="{28A0092B-C50C-407E-A947-70E740481C1C}">
+                <a14:useLocalDpi xmlns:a14="http://schemas.microsoft.com/office/drawing/2010/main" val="0"/>
+              </a:ext>
+            </a:extLst>
+          </a:blip>
+          <a:stretch>
+            <a:fillRect/>
+          </a:stretch>
+        </p:blipFill>
+        <p:spPr>
+          <a:xfrm>
+            <a:off x="5897103" y="3850447"/>
+            <a:ext cx="701101" cy="1371791"/>
+          </a:xfrm>
+          <a:prstGeom prst="rect">
+            <a:avLst/>
+          </a:prstGeom>
+        </p:spPr>
+      </p:pic>
+      <p:pic>
+        <p:nvPicPr>
+          <p:cNvPr id="9" name="Picture 8"/>
+          <p:cNvPicPr>
+            <a:picLocks/>
+          </p:cNvPicPr>
+          <p:nvPr/>
+        </p:nvPicPr>
+        <p:blipFill>
+          <a:blip r:embed="rId6">
+            <a:extLst>
+              <a:ext uri="{BEBA8EAE-BF5A-486C-A8C5-ECC9F3942E4B}">
+                <a14:imgProps xmlns:a14="http://schemas.microsoft.com/office/drawing/2010/main">
+                  <a14:imgLayer r:embed="rId7">
+                    <a14:imgEffect>
+                      <a14:backgroundRemoval t="0" b="98611" l="8696" r="99130">
+                        <a14:foregroundMark x1="28696" y1="9028" x2="26957" y2="4167"/>
+                        <a14:foregroundMark x1="46087" y1="11111" x2="51304" y2="5556"/>
+                        <a14:foregroundMark x1="56522" y1="20139" x2="54783" y2="26389"/>
+                      </a14:backgroundRemoval>
+                    </a14:imgEffect>
+                  </a14:imgLayer>
+                </a14:imgProps>
+              </a:ext>
+              <a:ext uri="{28A0092B-C50C-407E-A947-70E740481C1C}">
+                <a14:useLocalDpi xmlns:a14="http://schemas.microsoft.com/office/drawing/2010/main" val="0"/>
+              </a:ext>
+            </a:extLst>
+          </a:blip>
+          <a:stretch>
+            <a:fillRect/>
+          </a:stretch>
+        </p:blipFill>
+        <p:spPr>
+          <a:xfrm>
+            <a:off x="997031" y="5234337"/>
+            <a:ext cx="702000" cy="1371600"/>
+          </a:xfrm>
+          <a:prstGeom prst="rect">
+            <a:avLst/>
+          </a:prstGeom>
+        </p:spPr>
+      </p:pic>
+      <p:pic>
+        <p:nvPicPr>
+          <p:cNvPr id="10" name="Picture 9"/>
+          <p:cNvPicPr>
+            <a:picLocks/>
+          </p:cNvPicPr>
+          <p:nvPr/>
+        </p:nvPicPr>
+        <p:blipFill>
+          <a:blip r:embed="rId8">
+            <a:extLst>
+              <a:ext uri="{BEBA8EAE-BF5A-486C-A8C5-ECC9F3942E4B}">
+                <a14:imgProps xmlns:a14="http://schemas.microsoft.com/office/drawing/2010/main">
+                  <a14:imgLayer r:embed="rId9">
+                    <a14:imgEffect>
+                      <a14:backgroundRemoval t="1389" b="98611" l="0" r="100000">
+                        <a14:foregroundMark x1="87826" y1="20139" x2="84348" y2="13194"/>
+                        <a14:foregroundMark x1="10435" y1="20833" x2="16522" y2="13889"/>
+                        <a14:foregroundMark x1="58261" y1="30556" x2="64348" y2="31944"/>
+                      </a14:backgroundRemoval>
+                    </a14:imgEffect>
+                  </a14:imgLayer>
+                </a14:imgProps>
+              </a:ext>
+              <a:ext uri="{28A0092B-C50C-407E-A947-70E740481C1C}">
+                <a14:useLocalDpi xmlns:a14="http://schemas.microsoft.com/office/drawing/2010/main" val="0"/>
+              </a:ext>
+            </a:extLst>
+          </a:blip>
+          <a:stretch>
+            <a:fillRect/>
+          </a:stretch>
+        </p:blipFill>
+        <p:spPr>
+          <a:xfrm>
+            <a:off x="7057553" y="5486400"/>
+            <a:ext cx="702000" cy="1371600"/>
+          </a:xfrm>
+          <a:prstGeom prst="rect">
+            <a:avLst/>
+          </a:prstGeom>
+        </p:spPr>
+      </p:pic>
+      <p:pic>
+        <p:nvPicPr>
+          <p:cNvPr id="12" name="Picture 11"/>
+          <p:cNvPicPr>
+            <a:picLocks/>
+          </p:cNvPicPr>
+          <p:nvPr/>
+        </p:nvPicPr>
+        <p:blipFill>
+          <a:blip r:embed="rId10">
+            <a:extLst>
+              <a:ext uri="{BEBA8EAE-BF5A-486C-A8C5-ECC9F3942E4B}">
+                <a14:imgProps xmlns:a14="http://schemas.microsoft.com/office/drawing/2010/main">
+                  <a14:imgLayer r:embed="rId11">
+                    <a14:imgEffect>
+                      <a14:backgroundRemoval t="9028" b="100000" l="0" r="100000">
+                        <a14:foregroundMark x1="50435" y1="40972" x2="54783" y2="31250"/>
+                        <a14:foregroundMark x1="84348" y1="37500" x2="88696" y2="30556"/>
+                      </a14:backgroundRemoval>
+                    </a14:imgEffect>
+                  </a14:imgLayer>
+                </a14:imgProps>
+              </a:ext>
+              <a:ext uri="{28A0092B-C50C-407E-A947-70E740481C1C}">
+                <a14:useLocalDpi xmlns:a14="http://schemas.microsoft.com/office/drawing/2010/main" val="0"/>
+              </a:ext>
+            </a:extLst>
+          </a:blip>
+          <a:stretch>
+            <a:fillRect/>
+          </a:stretch>
+        </p:blipFill>
+        <p:spPr>
+          <a:xfrm>
+            <a:off x="3746265" y="5469436"/>
+            <a:ext cx="702000" cy="1371600"/>
+          </a:xfrm>
+          <a:prstGeom prst="rect">
+            <a:avLst/>
+          </a:prstGeom>
+        </p:spPr>
+      </p:pic>
+      <p:pic>
+        <p:nvPicPr>
+          <p:cNvPr id="13" name="Picture 12"/>
+          <p:cNvPicPr>
+            <a:picLocks/>
+          </p:cNvPicPr>
+          <p:nvPr/>
+        </p:nvPicPr>
+        <p:blipFill>
+          <a:blip r:embed="rId12">
+            <a:extLst>
+              <a:ext uri="{BEBA8EAE-BF5A-486C-A8C5-ECC9F3942E4B}">
+                <a14:imgProps xmlns:a14="http://schemas.microsoft.com/office/drawing/2010/main">
+                  <a14:imgLayer r:embed="rId13">
+                    <a14:imgEffect>
+                      <a14:backgroundRemoval t="9722" b="100000" l="5217" r="89565">
+                        <a14:foregroundMark x1="33913" y1="19444" x2="39130" y2="13194"/>
+                        <a14:foregroundMark x1="64348" y1="15972" x2="60000" y2="13194"/>
+                        <a14:foregroundMark x1="65217" y1="18750" x2="59130" y2="14583"/>
+                      </a14:backgroundRemoval>
+                    </a14:imgEffect>
+                  </a14:imgLayer>
+                </a14:imgProps>
+              </a:ext>
+              <a:ext uri="{28A0092B-C50C-407E-A947-70E740481C1C}">
+                <a14:useLocalDpi xmlns:a14="http://schemas.microsoft.com/office/drawing/2010/main" val="0"/>
+              </a:ext>
+            </a:extLst>
+          </a:blip>
+          <a:stretch>
+            <a:fillRect/>
+          </a:stretch>
+        </p:blipFill>
+        <p:spPr>
+          <a:xfrm>
+            <a:off x="4876533" y="5469436"/>
+            <a:ext cx="702000" cy="1371600"/>
+          </a:xfrm>
+          <a:prstGeom prst="rect">
+            <a:avLst/>
+          </a:prstGeom>
+        </p:spPr>
+      </p:pic>
+      <p:grpSp>
+        <p:nvGrpSpPr>
+          <p:cNvPr id="16" name="Group 15"/>
+          <p:cNvGrpSpPr/>
+          <p:nvPr/>
+        </p:nvGrpSpPr>
+        <p:grpSpPr>
+          <a:xfrm>
+            <a:off x="-4740855" y="-3003121"/>
+            <a:ext cx="6840305" cy="3883489"/>
+            <a:chOff x="1399558" y="202961"/>
+            <a:chExt cx="6840305" cy="3883489"/>
+          </a:xfrm>
+        </p:grpSpPr>
+        <p:pic>
+          <p:nvPicPr>
+            <p:cNvPr id="14" name="Picture 13"/>
+            <p:cNvPicPr>
+              <a:picLocks noChangeAspect="1"/>
+            </p:cNvPicPr>
+            <p:nvPr/>
+          </p:nvPicPr>
+          <p:blipFill>
+            <a:blip r:embed="rId14">
+              <a:extLst>
+                <a:ext uri="{28A0092B-C50C-407E-A947-70E740481C1C}">
+                  <a14:useLocalDpi xmlns:a14="http://schemas.microsoft.com/office/drawing/2010/main" val="0"/>
+                </a:ext>
+              </a:extLst>
+            </a:blip>
+            <a:stretch>
+              <a:fillRect/>
+            </a:stretch>
+          </p:blipFill>
+          <p:spPr>
+            <a:xfrm>
+              <a:off x="1399558" y="202961"/>
+              <a:ext cx="6840305" cy="3883489"/>
+            </a:xfrm>
+            <a:prstGeom prst="rect">
+              <a:avLst/>
+            </a:prstGeom>
+          </p:spPr>
+        </p:pic>
+        <p:pic>
+          <p:nvPicPr>
+            <p:cNvPr id="8" name="Picture 7"/>
+            <p:cNvPicPr>
+              <a:picLocks noChangeAspect="1"/>
+            </p:cNvPicPr>
+            <p:nvPr/>
+          </p:nvPicPr>
+          <p:blipFill>
+            <a:blip r:embed="rId15">
+              <a:extLst>
+                <a:ext uri="{28A0092B-C50C-407E-A947-70E740481C1C}">
+                  <a14:useLocalDpi xmlns:a14="http://schemas.microsoft.com/office/drawing/2010/main" val="0"/>
+                </a:ext>
+              </a:extLst>
+            </a:blip>
+            <a:stretch>
+              <a:fillRect/>
+            </a:stretch>
+          </p:blipFill>
+          <p:spPr>
+            <a:xfrm>
+              <a:off x="2508057" y="1113312"/>
+              <a:ext cx="911432" cy="1536881"/>
+            </a:xfrm>
+            <a:prstGeom prst="rect">
+              <a:avLst/>
+            </a:prstGeom>
+          </p:spPr>
+        </p:pic>
+        <p:pic>
+          <p:nvPicPr>
+            <p:cNvPr id="11" name="Picture 10"/>
+            <p:cNvPicPr>
+              <a:picLocks/>
+            </p:cNvPicPr>
+            <p:nvPr/>
+          </p:nvPicPr>
+          <p:blipFill>
+            <a:blip r:embed="rId16">
+              <a:extLst>
+                <a:ext uri="{BEBA8EAE-BF5A-486C-A8C5-ECC9F3942E4B}">
+                  <a14:imgProps xmlns:a14="http://schemas.microsoft.com/office/drawing/2010/main">
+                    <a14:imgLayer r:embed="rId17">
+                      <a14:imgEffect>
+                        <a14:backgroundRemoval t="893" b="100000" l="0" r="100000">
+                          <a14:foregroundMark x1="27619" y1="53571" x2="32381" y2="50893"/>
+                          <a14:foregroundMark x1="89524" y1="52679" x2="93333" y2="45536"/>
+                          <a14:foregroundMark x1="57143" y1="83036" x2="60000" y2="75893"/>
+                        </a14:backgroundRemoval>
+                      </a14:imgEffect>
+                    </a14:imgLayer>
+                  </a14:imgProps>
+                </a:ext>
+                <a:ext uri="{28A0092B-C50C-407E-A947-70E740481C1C}">
+                  <a14:useLocalDpi xmlns:a14="http://schemas.microsoft.com/office/drawing/2010/main" val="0"/>
+                </a:ext>
+              </a:extLst>
+            </a:blip>
+            <a:stretch>
+              <a:fillRect/>
+            </a:stretch>
+          </p:blipFill>
+          <p:spPr>
+            <a:xfrm flipH="1">
+              <a:off x="6305549" y="1845733"/>
+              <a:ext cx="539845" cy="621728"/>
+            </a:xfrm>
+            <a:prstGeom prst="rect">
+              <a:avLst/>
+            </a:prstGeom>
+          </p:spPr>
+        </p:pic>
+        <p:sp>
+          <p:nvSpPr>
+            <p:cNvPr id="15" name="TextBox 14"/>
+            <p:cNvSpPr txBox="1"/>
+            <p:nvPr/>
+          </p:nvSpPr>
+          <p:spPr>
+            <a:xfrm>
+              <a:off x="3264721" y="1460612"/>
+              <a:ext cx="2851939" cy="1569660"/>
+            </a:xfrm>
+            <a:prstGeom prst="rect">
+              <a:avLst/>
+            </a:prstGeom>
+            <a:noFill/>
+          </p:spPr>
+          <p:txBody>
+            <a:bodyPr wrap="square" rtlCol="0">
+              <a:spAutoFit/>
+              <a:scene3d>
+                <a:camera prst="orthographicFront"/>
+                <a:lightRig rig="threePt" dir="t"/>
+              </a:scene3d>
+              <a:sp3d extrusionH="57150">
+                <a:bevelT h="25400" prst="softRound"/>
+              </a:sp3d>
+            </a:bodyPr>
+            <a:lstStyle/>
+            <a:p>
+              <a:pPr algn="ctr"/>
+              <a:r>
+                <a:rPr lang="en-CA" sz="4800" dirty="0" smtClean="0">
+                  <a:solidFill>
+                    <a:srgbClr val="0070C0"/>
+                  </a:solidFill>
+                  <a:latin typeface="Harlow Solid Italic" panose="04030604020F02020D02" pitchFamily="82" charset="0"/>
+                </a:rPr>
+                <a:t>Player 1 wins!</a:t>
+              </a:r>
+              <a:endParaRPr lang="en-CA" sz="4800" dirty="0">
+                <a:solidFill>
+                  <a:srgbClr val="0070C0"/>
+                </a:solidFill>
+                <a:latin typeface="Harlow Solid Italic" panose="04030604020F02020D02" pitchFamily="82" charset="0"/>
+              </a:endParaRPr>
+            </a:p>
+          </p:txBody>
+        </p:sp>
+      </p:grpSp>
+      <p:grpSp>
+        <p:nvGrpSpPr>
+          <p:cNvPr id="35" name="Group 34"/>
+          <p:cNvGrpSpPr/>
+          <p:nvPr/>
+        </p:nvGrpSpPr>
+        <p:grpSpPr>
+          <a:xfrm>
+            <a:off x="5351695" y="1908702"/>
+            <a:ext cx="6840305" cy="3883489"/>
+            <a:chOff x="3178051" y="2334745"/>
+            <a:chExt cx="6840305" cy="3883489"/>
+          </a:xfrm>
+        </p:grpSpPr>
+        <p:grpSp>
+          <p:nvGrpSpPr>
+            <p:cNvPr id="18" name="Group 17"/>
+            <p:cNvGrpSpPr/>
+            <p:nvPr/>
+          </p:nvGrpSpPr>
+          <p:grpSpPr>
+            <a:xfrm>
+              <a:off x="3178051" y="2334745"/>
+              <a:ext cx="6840305" cy="3883489"/>
+              <a:chOff x="1399558" y="202961"/>
+              <a:chExt cx="6840305" cy="3883489"/>
+            </a:xfrm>
+          </p:grpSpPr>
+          <p:pic>
+            <p:nvPicPr>
+              <p:cNvPr id="19" name="Picture 18"/>
+              <p:cNvPicPr>
+                <a:picLocks noChangeAspect="1"/>
+              </p:cNvPicPr>
+              <p:nvPr/>
+            </p:nvPicPr>
+            <p:blipFill>
+              <a:blip r:embed="rId14">
+                <a:extLst>
+                  <a:ext uri="{28A0092B-C50C-407E-A947-70E740481C1C}">
+                    <a14:useLocalDpi xmlns:a14="http://schemas.microsoft.com/office/drawing/2010/main" val="0"/>
+                  </a:ext>
+                </a:extLst>
+              </a:blip>
+              <a:stretch>
+                <a:fillRect/>
+              </a:stretch>
+            </p:blipFill>
+            <p:spPr>
+              <a:xfrm>
+                <a:off x="1399558" y="202961"/>
+                <a:ext cx="6840305" cy="3883489"/>
+              </a:xfrm>
+              <a:prstGeom prst="rect">
+                <a:avLst/>
+              </a:prstGeom>
+            </p:spPr>
+          </p:pic>
+          <p:sp>
+            <p:nvSpPr>
+              <p:cNvPr id="22" name="TextBox 21"/>
+              <p:cNvSpPr txBox="1"/>
+              <p:nvPr/>
+            </p:nvSpPr>
+            <p:spPr>
+              <a:xfrm>
+                <a:off x="3264721" y="1460612"/>
+                <a:ext cx="2851939" cy="1569660"/>
+              </a:xfrm>
+              <a:prstGeom prst="rect">
+                <a:avLst/>
+              </a:prstGeom>
+              <a:noFill/>
+            </p:spPr>
+            <p:txBody>
+              <a:bodyPr wrap="square" rtlCol="0">
+                <a:spAutoFit/>
+                <a:scene3d>
+                  <a:camera prst="orthographicFront"/>
+                  <a:lightRig rig="threePt" dir="t"/>
+                </a:scene3d>
+                <a:sp3d extrusionH="57150">
+                  <a:bevelT h="25400" prst="softRound"/>
+                </a:sp3d>
+              </a:bodyPr>
+              <a:lstStyle/>
+              <a:p>
+                <a:pPr algn="ctr"/>
+                <a:r>
+                  <a:rPr lang="en-CA" sz="4800" dirty="0" smtClean="0">
+                    <a:solidFill>
+                      <a:srgbClr val="C00000"/>
+                    </a:solidFill>
+                    <a:latin typeface="Harlow Solid Italic" panose="04030604020F02020D02" pitchFamily="82" charset="0"/>
+                  </a:rPr>
+                  <a:t>Player 2 wins!</a:t>
+                </a:r>
+                <a:endParaRPr lang="en-CA" sz="4800" dirty="0">
+                  <a:solidFill>
+                    <a:srgbClr val="C00000"/>
+                  </a:solidFill>
+                  <a:latin typeface="Harlow Solid Italic" panose="04030604020F02020D02" pitchFamily="82" charset="0"/>
+                </a:endParaRPr>
+              </a:p>
+            </p:txBody>
+          </p:sp>
+        </p:grpSp>
+        <p:pic>
+          <p:nvPicPr>
+            <p:cNvPr id="23" name="Picture 22"/>
+            <p:cNvPicPr>
+              <a:picLocks/>
+            </p:cNvPicPr>
+            <p:nvPr/>
+          </p:nvPicPr>
+          <p:blipFill>
+            <a:blip r:embed="rId8">
+              <a:extLst>
+                <a:ext uri="{BEBA8EAE-BF5A-486C-A8C5-ECC9F3942E4B}">
+                  <a14:imgProps xmlns:a14="http://schemas.microsoft.com/office/drawing/2010/main">
+                    <a14:imgLayer r:embed="rId9">
+                      <a14:imgEffect>
+                        <a14:backgroundRemoval t="1389" b="98611" l="0" r="100000">
+                          <a14:foregroundMark x1="87826" y1="20139" x2="84348" y2="13194"/>
+                          <a14:foregroundMark x1="10435" y1="20833" x2="16522" y2="13889"/>
+                          <a14:foregroundMark x1="58261" y1="30556" x2="64348" y2="31944"/>
+                        </a14:backgroundRemoval>
+                      </a14:imgEffect>
+                    </a14:imgLayer>
+                  </a14:imgProps>
+                </a:ext>
+                <a:ext uri="{28A0092B-C50C-407E-A947-70E740481C1C}">
+                  <a14:useLocalDpi xmlns:a14="http://schemas.microsoft.com/office/drawing/2010/main" val="0"/>
+                </a:ext>
+              </a:extLst>
+            </a:blip>
+            <a:stretch>
+              <a:fillRect/>
+            </a:stretch>
+          </p:blipFill>
+          <p:spPr>
+            <a:xfrm>
+              <a:off x="4218458" y="3300422"/>
+              <a:ext cx="932299" cy="1491573"/>
+            </a:xfrm>
+            <a:prstGeom prst="rect">
+              <a:avLst/>
+            </a:prstGeom>
+          </p:spPr>
+        </p:pic>
+        <p:pic>
+          <p:nvPicPr>
+            <p:cNvPr id="24" name="Picture 23"/>
+            <p:cNvPicPr>
+              <a:picLocks noChangeAspect="1"/>
+            </p:cNvPicPr>
+            <p:nvPr/>
+          </p:nvPicPr>
+          <p:blipFill>
+            <a:blip r:embed="rId2">
+              <a:extLst>
+                <a:ext uri="{28A0092B-C50C-407E-A947-70E740481C1C}">
+                  <a14:useLocalDpi xmlns:a14="http://schemas.microsoft.com/office/drawing/2010/main" val="0"/>
+                </a:ext>
+              </a:extLst>
+            </a:blip>
+            <a:stretch>
+              <a:fillRect/>
+            </a:stretch>
+          </p:blipFill>
+          <p:spPr>
+            <a:xfrm flipH="1">
+              <a:off x="8059862" y="3993024"/>
+              <a:ext cx="553173" cy="601796"/>
+            </a:xfrm>
+            <a:prstGeom prst="rect">
+              <a:avLst/>
+            </a:prstGeom>
+          </p:spPr>
+        </p:pic>
+      </p:grpSp>
+      <p:pic>
+        <p:nvPicPr>
+          <p:cNvPr id="25" name="Picture 24"/>
+          <p:cNvPicPr>
+            <a:picLocks noChangeAspect="1"/>
+          </p:cNvPicPr>
+          <p:nvPr/>
+        </p:nvPicPr>
+        <p:blipFill>
+          <a:blip r:embed="rId2">
+            <a:extLst>
+              <a:ext uri="{28A0092B-C50C-407E-A947-70E740481C1C}">
+                <a14:useLocalDpi xmlns:a14="http://schemas.microsoft.com/office/drawing/2010/main" val="0"/>
+              </a:ext>
+            </a:extLst>
+          </a:blip>
+          <a:stretch>
+            <a:fillRect/>
+          </a:stretch>
+        </p:blipFill>
+        <p:spPr>
+          <a:xfrm>
+            <a:off x="796168" y="4112539"/>
+            <a:ext cx="810838" cy="871804"/>
+          </a:xfrm>
+          <a:prstGeom prst="rect">
+            <a:avLst/>
+          </a:prstGeom>
+        </p:spPr>
+      </p:pic>
+      <p:pic>
+        <p:nvPicPr>
+          <p:cNvPr id="31" name="Picture 30"/>
+          <p:cNvPicPr>
+            <a:picLocks noChangeAspect="1"/>
+          </p:cNvPicPr>
+          <p:nvPr/>
+        </p:nvPicPr>
+        <p:blipFill rotWithShape="1">
+          <a:blip r:embed="rId18"/>
+          <a:srcRect l="10194" t="-333" r="13759" b="396"/>
+          <a:stretch/>
+        </p:blipFill>
+        <p:spPr>
+          <a:xfrm>
+            <a:off x="4798815" y="111904"/>
+            <a:ext cx="3261048" cy="2447388"/>
+          </a:xfrm>
+          <a:prstGeom prst="rect">
+            <a:avLst/>
+          </a:prstGeom>
+        </p:spPr>
+      </p:pic>
+      <p:pic>
+        <p:nvPicPr>
+          <p:cNvPr id="43" name="Picture 42"/>
+          <p:cNvPicPr>
+            <a:picLocks noChangeAspect="1"/>
+          </p:cNvPicPr>
+          <p:nvPr/>
+        </p:nvPicPr>
+        <p:blipFill rotWithShape="1">
+          <a:blip r:embed="rId19"/>
+          <a:srcRect l="10727" r="14028"/>
+          <a:stretch/>
+        </p:blipFill>
+        <p:spPr>
+          <a:xfrm>
+            <a:off x="904240" y="144555"/>
+            <a:ext cx="3200400" cy="2414737"/>
+          </a:xfrm>
+          <a:prstGeom prst="rect">
+            <a:avLst/>
+          </a:prstGeom>
+        </p:spPr>
+      </p:pic>
+    </p:spTree>
+    <p:extLst>
+      <p:ext uri="{BB962C8B-B14F-4D97-AF65-F5344CB8AC3E}">
+        <p14:creationId xmlns:p14="http://schemas.microsoft.com/office/powerpoint/2010/main" val="1093650580"/>
       </p:ext>
     </p:extLst>
   </p:cSld>

</xml_diff>